<commit_message>
jornada de usuário ong
</commit_message>
<xml_diff>
--- a/docs/Sprint 1 - Entregavel de PI - Design de Interação.pptx
+++ b/docs/Sprint 1 - Entregavel de PI - Design de Interação.pptx
@@ -5,7 +5,7 @@
     <p:sldMasterId id="2147483648" r:id="rId4"/>
   </p:sldMasterIdLst>
   <p:notesMasterIdLst>
-    <p:notesMasterId r:id="rId17"/>
+    <p:notesMasterId r:id="rId18"/>
   </p:notesMasterIdLst>
   <p:sldIdLst>
     <p:sldId id="257" r:id="rId5"/>
@@ -19,7 +19,8 @@
     <p:sldId id="975" r:id="rId13"/>
     <p:sldId id="967" r:id="rId14"/>
     <p:sldId id="972" r:id="rId15"/>
-    <p:sldId id="272" r:id="rId16"/>
+    <p:sldId id="976" r:id="rId16"/>
+    <p:sldId id="272" r:id="rId17"/>
   </p:sldIdLst>
   <p:sldSz cx="12192000" cy="6858000"/>
   <p:notesSz cx="6858000" cy="9144000"/>
@@ -631,7 +632,7 @@
           <a:p>
             <a:fld id="{8AC79F10-E06E-4CE2-A9B4-B99BB230B28A}" type="datetimeFigureOut">
               <a:rPr lang="pt-BR" smtClean="0"/>
-              <a:t>17/03/2022</a:t>
+              <a:t>27/04/2022</a:t>
             </a:fld>
             <a:endParaRPr lang="pt-BR"/>
           </a:p>
@@ -12864,6 +12865,1358 @@
           <a:chExt cx="0" cy="0"/>
         </a:xfrm>
       </p:grpSpPr>
+      <p:sp>
+        <p:nvSpPr>
+          <p:cNvPr id="34" name="Título 5">
+            <a:extLst>
+              <a:ext uri="{FF2B5EF4-FFF2-40B4-BE49-F238E27FC236}">
+                <a16:creationId xmlns:a16="http://schemas.microsoft.com/office/drawing/2014/main" id="{ED30AEBC-B489-433B-96FE-4500262893C3}"/>
+              </a:ext>
+            </a:extLst>
+          </p:cNvPr>
+          <p:cNvSpPr>
+            <a:spLocks noGrp="1"/>
+          </p:cNvSpPr>
+          <p:nvPr>
+            <p:ph type="title"/>
+          </p:nvPr>
+        </p:nvSpPr>
+        <p:spPr>
+          <a:xfrm>
+            <a:off x="672352" y="50502"/>
+            <a:ext cx="10554448" cy="660473"/>
+          </a:xfrm>
+        </p:spPr>
+        <p:txBody>
+          <a:bodyPr/>
+          <a:lstStyle/>
+          <a:p>
+            <a:r>
+              <a:rPr lang="pt-BR" dirty="0"/>
+              <a:t>Jornada - Simplificada</a:t>
+            </a:r>
+          </a:p>
+        </p:txBody>
+      </p:sp>
+      <p:sp>
+        <p:nvSpPr>
+          <p:cNvPr id="35" name="Seta: Pentágono 34">
+            <a:extLst>
+              <a:ext uri="{FF2B5EF4-FFF2-40B4-BE49-F238E27FC236}">
+                <a16:creationId xmlns:a16="http://schemas.microsoft.com/office/drawing/2014/main" id="{3ABD1C0F-DBD4-46D5-89AE-8D4ADB9A600C}"/>
+              </a:ext>
+            </a:extLst>
+          </p:cNvPr>
+          <p:cNvSpPr/>
+          <p:nvPr/>
+        </p:nvSpPr>
+        <p:spPr>
+          <a:xfrm>
+            <a:off x="3054600" y="996615"/>
+            <a:ext cx="2037351" cy="573368"/>
+          </a:xfrm>
+          <a:prstGeom prst="homePlate">
+            <a:avLst/>
+          </a:prstGeom>
+          <a:solidFill>
+            <a:srgbClr val="32B9CD"/>
+          </a:solidFill>
+          <a:ln>
+            <a:noFill/>
+          </a:ln>
+        </p:spPr>
+        <p:style>
+          <a:lnRef idx="2">
+            <a:schemeClr val="accent1">
+              <a:shade val="50000"/>
+            </a:schemeClr>
+          </a:lnRef>
+          <a:fillRef idx="1">
+            <a:schemeClr val="accent1"/>
+          </a:fillRef>
+          <a:effectRef idx="0">
+            <a:schemeClr val="accent1"/>
+          </a:effectRef>
+          <a:fontRef idx="minor">
+            <a:schemeClr val="lt1"/>
+          </a:fontRef>
+        </p:style>
+        <p:txBody>
+          <a:bodyPr rtlCol="0" anchor="ctr"/>
+          <a:lstStyle/>
+          <a:p>
+            <a:pPr algn="ctr"/>
+            <a:r>
+              <a:rPr lang="pt-BR" sz="1400" b="1" dirty="0"/>
+              <a:t>Usuário que quer cadastrar a ONG</a:t>
+            </a:r>
+          </a:p>
+        </p:txBody>
+      </p:sp>
+      <p:cxnSp>
+        <p:nvCxnSpPr>
+          <p:cNvPr id="36" name="Conector reto 35">
+            <a:extLst>
+              <a:ext uri="{FF2B5EF4-FFF2-40B4-BE49-F238E27FC236}">
+                <a16:creationId xmlns:a16="http://schemas.microsoft.com/office/drawing/2014/main" id="{7B5FB900-44BB-4E49-91D7-80EFAB5269DC}"/>
+              </a:ext>
+            </a:extLst>
+          </p:cNvPr>
+          <p:cNvCxnSpPr>
+            <a:cxnSpLocks/>
+          </p:cNvCxnSpPr>
+          <p:nvPr/>
+        </p:nvCxnSpPr>
+        <p:spPr>
+          <a:xfrm>
+            <a:off x="672352" y="1763806"/>
+            <a:ext cx="10554448" cy="0"/>
+          </a:xfrm>
+          <a:prstGeom prst="line">
+            <a:avLst/>
+          </a:prstGeom>
+          <a:ln>
+            <a:solidFill>
+              <a:srgbClr val="32B9CD"/>
+            </a:solidFill>
+          </a:ln>
+        </p:spPr>
+        <p:style>
+          <a:lnRef idx="1">
+            <a:schemeClr val="accent1"/>
+          </a:lnRef>
+          <a:fillRef idx="0">
+            <a:schemeClr val="accent1"/>
+          </a:fillRef>
+          <a:effectRef idx="0">
+            <a:schemeClr val="accent1"/>
+          </a:effectRef>
+          <a:fontRef idx="minor">
+            <a:schemeClr val="tx1"/>
+          </a:fontRef>
+        </p:style>
+      </p:cxnSp>
+      <p:sp>
+        <p:nvSpPr>
+          <p:cNvPr id="37" name="Retângulo 36">
+            <a:extLst>
+              <a:ext uri="{FF2B5EF4-FFF2-40B4-BE49-F238E27FC236}">
+                <a16:creationId xmlns:a16="http://schemas.microsoft.com/office/drawing/2014/main" id="{4E8F30AA-E5E2-43B1-94B0-F9F75091AAA0}"/>
+              </a:ext>
+            </a:extLst>
+          </p:cNvPr>
+          <p:cNvSpPr/>
+          <p:nvPr/>
+        </p:nvSpPr>
+        <p:spPr>
+          <a:xfrm>
+            <a:off x="3054600" y="1821034"/>
+            <a:ext cx="2037351" cy="584775"/>
+          </a:xfrm>
+          <a:prstGeom prst="rect">
+            <a:avLst/>
+          </a:prstGeom>
+        </p:spPr>
+        <p:txBody>
+          <a:bodyPr wrap="square" lIns="91440" tIns="45720" rIns="91440" bIns="45720" anchor="t">
+            <a:spAutoFit/>
+          </a:bodyPr>
+          <a:lstStyle/>
+          <a:p>
+            <a:pPr marL="342900" indent="-342900">
+              <a:buFont typeface="Arial" panose="020B0604020202020204" pitchFamily="34" charset="0"/>
+              <a:buChar char="•"/>
+            </a:pPr>
+            <a:r>
+              <a:rPr lang="pt-BR" sz="1600" dirty="0">
+                <a:latin typeface="Exo 2"/>
+              </a:rPr>
+              <a:t>Ver várias ONG e seus projetos</a:t>
+            </a:r>
+          </a:p>
+        </p:txBody>
+      </p:sp>
+      <p:cxnSp>
+        <p:nvCxnSpPr>
+          <p:cNvPr id="38" name="Conector reto 37">
+            <a:extLst>
+              <a:ext uri="{FF2B5EF4-FFF2-40B4-BE49-F238E27FC236}">
+                <a16:creationId xmlns:a16="http://schemas.microsoft.com/office/drawing/2014/main" id="{C3D6F53F-9788-4A39-92E6-081069C89997}"/>
+              </a:ext>
+            </a:extLst>
+          </p:cNvPr>
+          <p:cNvCxnSpPr>
+            <a:cxnSpLocks/>
+          </p:cNvCxnSpPr>
+          <p:nvPr/>
+        </p:nvCxnSpPr>
+        <p:spPr>
+          <a:xfrm>
+            <a:off x="672352" y="2862692"/>
+            <a:ext cx="10554448" cy="0"/>
+          </a:xfrm>
+          <a:prstGeom prst="line">
+            <a:avLst/>
+          </a:prstGeom>
+          <a:ln>
+            <a:solidFill>
+              <a:srgbClr val="32B9CD"/>
+            </a:solidFill>
+          </a:ln>
+        </p:spPr>
+        <p:style>
+          <a:lnRef idx="1">
+            <a:schemeClr val="accent1"/>
+          </a:lnRef>
+          <a:fillRef idx="0">
+            <a:schemeClr val="accent1"/>
+          </a:fillRef>
+          <a:effectRef idx="0">
+            <a:schemeClr val="accent1"/>
+          </a:effectRef>
+          <a:fontRef idx="minor">
+            <a:schemeClr val="tx1"/>
+          </a:fontRef>
+        </p:style>
+      </p:cxnSp>
+      <p:sp>
+        <p:nvSpPr>
+          <p:cNvPr id="39" name="Retângulo 38">
+            <a:extLst>
+              <a:ext uri="{FF2B5EF4-FFF2-40B4-BE49-F238E27FC236}">
+                <a16:creationId xmlns:a16="http://schemas.microsoft.com/office/drawing/2014/main" id="{BA8F97BC-4337-4F5F-972E-EEF6066764D6}"/>
+              </a:ext>
+            </a:extLst>
+          </p:cNvPr>
+          <p:cNvSpPr/>
+          <p:nvPr/>
+        </p:nvSpPr>
+        <p:spPr>
+          <a:xfrm>
+            <a:off x="672352" y="940464"/>
+            <a:ext cx="2184972" cy="769441"/>
+          </a:xfrm>
+          <a:prstGeom prst="rect">
+            <a:avLst/>
+          </a:prstGeom>
+        </p:spPr>
+        <p:txBody>
+          <a:bodyPr wrap="square">
+            <a:spAutoFit/>
+          </a:bodyPr>
+          <a:lstStyle/>
+          <a:p>
+            <a:r>
+              <a:rPr lang="pt-BR" sz="2800" b="1" dirty="0">
+                <a:solidFill>
+                  <a:srgbClr val="E6005A"/>
+                </a:solidFill>
+                <a:latin typeface="Exo 2" panose="00000500000000000000" pitchFamily="50" charset="0"/>
+              </a:rPr>
+              <a:t>Fases </a:t>
+            </a:r>
+            <a:r>
+              <a:rPr lang="pt-BR" sz="1600" b="1" dirty="0">
+                <a:solidFill>
+                  <a:srgbClr val="E6005A"/>
+                </a:solidFill>
+                <a:latin typeface="Exo 2" panose="00000500000000000000" pitchFamily="50" charset="0"/>
+              </a:rPr>
+              <a:t>(utilizador)</a:t>
+            </a:r>
+          </a:p>
+        </p:txBody>
+      </p:sp>
+      <p:sp>
+        <p:nvSpPr>
+          <p:cNvPr id="40" name="Retângulo 39">
+            <a:extLst>
+              <a:ext uri="{FF2B5EF4-FFF2-40B4-BE49-F238E27FC236}">
+                <a16:creationId xmlns:a16="http://schemas.microsoft.com/office/drawing/2014/main" id="{919AD702-7BBE-4309-A4D6-96492BB6AC24}"/>
+              </a:ext>
+            </a:extLst>
+          </p:cNvPr>
+          <p:cNvSpPr/>
+          <p:nvPr/>
+        </p:nvSpPr>
+        <p:spPr>
+          <a:xfrm>
+            <a:off x="672352" y="1821034"/>
+            <a:ext cx="2184972" cy="800219"/>
+          </a:xfrm>
+          <a:prstGeom prst="rect">
+            <a:avLst/>
+          </a:prstGeom>
+        </p:spPr>
+        <p:txBody>
+          <a:bodyPr wrap="square">
+            <a:spAutoFit/>
+          </a:bodyPr>
+          <a:lstStyle/>
+          <a:p>
+            <a:r>
+              <a:rPr lang="pt-BR" sz="2800" b="1" dirty="0">
+                <a:solidFill>
+                  <a:srgbClr val="E6005A"/>
+                </a:solidFill>
+                <a:latin typeface="Exo 2" panose="00000500000000000000" pitchFamily="50" charset="0"/>
+              </a:rPr>
+              <a:t>Faz</a:t>
+            </a:r>
+          </a:p>
+          <a:p>
+            <a:r>
+              <a:rPr lang="pt-BR" sz="1800" b="1" dirty="0">
+                <a:solidFill>
+                  <a:srgbClr val="E6005A"/>
+                </a:solidFill>
+                <a:latin typeface="Exo 2" panose="00000500000000000000" pitchFamily="50" charset="0"/>
+              </a:rPr>
+              <a:t>(ações do usuário) </a:t>
+            </a:r>
+          </a:p>
+        </p:txBody>
+      </p:sp>
+      <p:sp>
+        <p:nvSpPr>
+          <p:cNvPr id="41" name="Retângulo 40">
+            <a:extLst>
+              <a:ext uri="{FF2B5EF4-FFF2-40B4-BE49-F238E27FC236}">
+                <a16:creationId xmlns:a16="http://schemas.microsoft.com/office/drawing/2014/main" id="{52112AF7-1BB5-4A94-8965-35ACFFBEA61F}"/>
+              </a:ext>
+            </a:extLst>
+          </p:cNvPr>
+          <p:cNvSpPr/>
+          <p:nvPr/>
+        </p:nvSpPr>
+        <p:spPr>
+          <a:xfrm>
+            <a:off x="672352" y="2952800"/>
+            <a:ext cx="2382248" cy="830997"/>
+          </a:xfrm>
+          <a:prstGeom prst="rect">
+            <a:avLst/>
+          </a:prstGeom>
+        </p:spPr>
+        <p:txBody>
+          <a:bodyPr wrap="square">
+            <a:spAutoFit/>
+          </a:bodyPr>
+          <a:lstStyle/>
+          <a:p>
+            <a:r>
+              <a:rPr lang="pt-BR" sz="2800" b="1" dirty="0">
+                <a:solidFill>
+                  <a:srgbClr val="E6005A"/>
+                </a:solidFill>
+                <a:latin typeface="Exo 2" panose="00000500000000000000" pitchFamily="50" charset="0"/>
+              </a:rPr>
+              <a:t>Sente</a:t>
+            </a:r>
+          </a:p>
+          <a:p>
+            <a:r>
+              <a:rPr lang="pt-BR" sz="2000" b="1" dirty="0">
+                <a:solidFill>
+                  <a:srgbClr val="E6005A"/>
+                </a:solidFill>
+                <a:latin typeface="Exo 2" panose="00000500000000000000" pitchFamily="50" charset="0"/>
+              </a:rPr>
+              <a:t>(dores do usuário) </a:t>
+            </a:r>
+          </a:p>
+        </p:txBody>
+      </p:sp>
+      <p:cxnSp>
+        <p:nvCxnSpPr>
+          <p:cNvPr id="42" name="Conector reto 41">
+            <a:extLst>
+              <a:ext uri="{FF2B5EF4-FFF2-40B4-BE49-F238E27FC236}">
+                <a16:creationId xmlns:a16="http://schemas.microsoft.com/office/drawing/2014/main" id="{31066887-5B7C-4D2A-B7E4-4ECE3425FBCE}"/>
+              </a:ext>
+            </a:extLst>
+          </p:cNvPr>
+          <p:cNvCxnSpPr>
+            <a:cxnSpLocks/>
+          </p:cNvCxnSpPr>
+          <p:nvPr/>
+        </p:nvCxnSpPr>
+        <p:spPr>
+          <a:xfrm>
+            <a:off x="672352" y="3977621"/>
+            <a:ext cx="10554448" cy="0"/>
+          </a:xfrm>
+          <a:prstGeom prst="line">
+            <a:avLst/>
+          </a:prstGeom>
+          <a:ln>
+            <a:solidFill>
+              <a:srgbClr val="32B9CD"/>
+            </a:solidFill>
+          </a:ln>
+        </p:spPr>
+        <p:style>
+          <a:lnRef idx="1">
+            <a:schemeClr val="accent1"/>
+          </a:lnRef>
+          <a:fillRef idx="0">
+            <a:schemeClr val="accent1"/>
+          </a:fillRef>
+          <a:effectRef idx="0">
+            <a:schemeClr val="accent1"/>
+          </a:effectRef>
+          <a:fontRef idx="minor">
+            <a:schemeClr val="tx1"/>
+          </a:fontRef>
+        </p:style>
+      </p:cxnSp>
+      <p:sp>
+        <p:nvSpPr>
+          <p:cNvPr id="43" name="Retângulo 42">
+            <a:extLst>
+              <a:ext uri="{FF2B5EF4-FFF2-40B4-BE49-F238E27FC236}">
+                <a16:creationId xmlns:a16="http://schemas.microsoft.com/office/drawing/2014/main" id="{C1F9B84A-3928-43E0-A58A-29C75435604B}"/>
+              </a:ext>
+            </a:extLst>
+          </p:cNvPr>
+          <p:cNvSpPr/>
+          <p:nvPr/>
+        </p:nvSpPr>
+        <p:spPr>
+          <a:xfrm>
+            <a:off x="3142832" y="4267456"/>
+            <a:ext cx="2037351" cy="830997"/>
+          </a:xfrm>
+          <a:prstGeom prst="rect">
+            <a:avLst/>
+          </a:prstGeom>
+        </p:spPr>
+        <p:txBody>
+          <a:bodyPr wrap="square" lIns="91440" tIns="45720" rIns="91440" bIns="45720" anchor="t">
+            <a:spAutoFit/>
+          </a:bodyPr>
+          <a:lstStyle/>
+          <a:p>
+            <a:pPr marL="342900" indent="-342900">
+              <a:buFont typeface="Arial" panose="020B0604020202020204" pitchFamily="34" charset="0"/>
+              <a:buChar char="•"/>
+            </a:pPr>
+            <a:r>
+              <a:rPr lang="pt-BR" sz="1600" dirty="0">
+                <a:latin typeface="Exo 2"/>
+              </a:rPr>
+              <a:t>Feliz em ver tantas companhas de ONG</a:t>
+            </a:r>
+          </a:p>
+        </p:txBody>
+      </p:sp>
+      <p:cxnSp>
+        <p:nvCxnSpPr>
+          <p:cNvPr id="44" name="Conector reto 43">
+            <a:extLst>
+              <a:ext uri="{FF2B5EF4-FFF2-40B4-BE49-F238E27FC236}">
+                <a16:creationId xmlns:a16="http://schemas.microsoft.com/office/drawing/2014/main" id="{7AF037DC-90E9-4E5E-A6C1-66797712E46F}"/>
+              </a:ext>
+            </a:extLst>
+          </p:cNvPr>
+          <p:cNvCxnSpPr>
+            <a:cxnSpLocks/>
+          </p:cNvCxnSpPr>
+          <p:nvPr/>
+        </p:nvCxnSpPr>
+        <p:spPr>
+          <a:xfrm>
+            <a:off x="672352" y="5453500"/>
+            <a:ext cx="10554448" cy="0"/>
+          </a:xfrm>
+          <a:prstGeom prst="line">
+            <a:avLst/>
+          </a:prstGeom>
+          <a:ln>
+            <a:solidFill>
+              <a:srgbClr val="32B9CD"/>
+            </a:solidFill>
+          </a:ln>
+        </p:spPr>
+        <p:style>
+          <a:lnRef idx="1">
+            <a:schemeClr val="accent1"/>
+          </a:lnRef>
+          <a:fillRef idx="0">
+            <a:schemeClr val="accent1"/>
+          </a:fillRef>
+          <a:effectRef idx="0">
+            <a:schemeClr val="accent1"/>
+          </a:effectRef>
+          <a:fontRef idx="minor">
+            <a:schemeClr val="tx1"/>
+          </a:fontRef>
+        </p:style>
+      </p:cxnSp>
+      <p:sp>
+        <p:nvSpPr>
+          <p:cNvPr id="45" name="Retângulo 44">
+            <a:extLst>
+              <a:ext uri="{FF2B5EF4-FFF2-40B4-BE49-F238E27FC236}">
+                <a16:creationId xmlns:a16="http://schemas.microsoft.com/office/drawing/2014/main" id="{C954EEA9-514B-4E23-A137-96D8885F54A7}"/>
+              </a:ext>
+            </a:extLst>
+          </p:cNvPr>
+          <p:cNvSpPr/>
+          <p:nvPr/>
+        </p:nvSpPr>
+        <p:spPr>
+          <a:xfrm>
+            <a:off x="672352" y="4267456"/>
+            <a:ext cx="2184972" cy="830997"/>
+          </a:xfrm>
+          <a:prstGeom prst="rect">
+            <a:avLst/>
+          </a:prstGeom>
+        </p:spPr>
+        <p:txBody>
+          <a:bodyPr wrap="square">
+            <a:spAutoFit/>
+          </a:bodyPr>
+          <a:lstStyle/>
+          <a:p>
+            <a:r>
+              <a:rPr lang="pt-BR" sz="2800" b="1" dirty="0">
+                <a:solidFill>
+                  <a:srgbClr val="E6005A"/>
+                </a:solidFill>
+                <a:latin typeface="Exo 2" panose="00000500000000000000" pitchFamily="50" charset="0"/>
+              </a:rPr>
+              <a:t>Pensa</a:t>
+            </a:r>
+          </a:p>
+          <a:p>
+            <a:r>
+              <a:rPr lang="pt-BR" sz="2000" b="1" dirty="0">
+                <a:solidFill>
+                  <a:srgbClr val="E6005A"/>
+                </a:solidFill>
+                <a:latin typeface="Exo 2" panose="00000500000000000000" pitchFamily="50" charset="0"/>
+              </a:rPr>
+              <a:t>(usuário) </a:t>
+            </a:r>
+          </a:p>
+        </p:txBody>
+      </p:sp>
+      <p:sp>
+        <p:nvSpPr>
+          <p:cNvPr id="46" name="Retângulo 45">
+            <a:extLst>
+              <a:ext uri="{FF2B5EF4-FFF2-40B4-BE49-F238E27FC236}">
+                <a16:creationId xmlns:a16="http://schemas.microsoft.com/office/drawing/2014/main" id="{42355972-AFB4-41EA-BD6F-B75E79CD0432}"/>
+              </a:ext>
+            </a:extLst>
+          </p:cNvPr>
+          <p:cNvSpPr/>
+          <p:nvPr/>
+        </p:nvSpPr>
+        <p:spPr>
+          <a:xfrm>
+            <a:off x="680374" y="5644778"/>
+            <a:ext cx="2184972" cy="800219"/>
+          </a:xfrm>
+          <a:prstGeom prst="rect">
+            <a:avLst/>
+          </a:prstGeom>
+        </p:spPr>
+        <p:txBody>
+          <a:bodyPr wrap="square">
+            <a:spAutoFit/>
+          </a:bodyPr>
+          <a:lstStyle/>
+          <a:p>
+            <a:r>
+              <a:rPr lang="pt-BR" sz="2800" b="1" dirty="0">
+                <a:solidFill>
+                  <a:srgbClr val="E6005A"/>
+                </a:solidFill>
+                <a:latin typeface="Exo 2" panose="00000500000000000000" pitchFamily="50" charset="0"/>
+              </a:rPr>
+              <a:t>Proposta</a:t>
+            </a:r>
+          </a:p>
+          <a:p>
+            <a:r>
+              <a:rPr lang="pt-BR" sz="1800" b="1" dirty="0">
+                <a:solidFill>
+                  <a:srgbClr val="E6005A"/>
+                </a:solidFill>
+                <a:latin typeface="Exo 2" panose="00000500000000000000" pitchFamily="50" charset="0"/>
+              </a:rPr>
+              <a:t>(mudanças) </a:t>
+            </a:r>
+          </a:p>
+        </p:txBody>
+      </p:sp>
+      <p:sp>
+        <p:nvSpPr>
+          <p:cNvPr id="47" name="Retângulo 46">
+            <a:extLst>
+              <a:ext uri="{FF2B5EF4-FFF2-40B4-BE49-F238E27FC236}">
+                <a16:creationId xmlns:a16="http://schemas.microsoft.com/office/drawing/2014/main" id="{824BD9E3-08CF-496D-98D5-6DAB61E3F6BF}"/>
+              </a:ext>
+            </a:extLst>
+          </p:cNvPr>
+          <p:cNvSpPr/>
+          <p:nvPr/>
+        </p:nvSpPr>
+        <p:spPr>
+          <a:xfrm>
+            <a:off x="3142831" y="5658267"/>
+            <a:ext cx="2037351" cy="1169551"/>
+          </a:xfrm>
+          <a:prstGeom prst="rect">
+            <a:avLst/>
+          </a:prstGeom>
+        </p:spPr>
+        <p:txBody>
+          <a:bodyPr wrap="square">
+            <a:spAutoFit/>
+          </a:bodyPr>
+          <a:lstStyle/>
+          <a:p>
+            <a:pPr marL="342900" indent="-342900">
+              <a:buFont typeface="Arial" panose="020B0604020202020204" pitchFamily="34" charset="0"/>
+              <a:buChar char="•"/>
+            </a:pPr>
+            <a:r>
+              <a:rPr lang="pt-BR" sz="1400" dirty="0">
+                <a:latin typeface="Exo 2" panose="00000500000000000000" pitchFamily="50" charset="0"/>
+              </a:rPr>
+              <a:t>No aplicativo o usuário terá um catálogo de ONG com descrição das mesmas</a:t>
+            </a:r>
+          </a:p>
+        </p:txBody>
+      </p:sp>
+      <p:sp>
+        <p:nvSpPr>
+          <p:cNvPr id="48" name="Seta: Pentágono 47">
+            <a:extLst>
+              <a:ext uri="{FF2B5EF4-FFF2-40B4-BE49-F238E27FC236}">
+                <a16:creationId xmlns:a16="http://schemas.microsoft.com/office/drawing/2014/main" id="{2AFAEAD8-F741-4194-AEBD-B1B9FDBEC2D7}"/>
+              </a:ext>
+            </a:extLst>
+          </p:cNvPr>
+          <p:cNvSpPr/>
+          <p:nvPr/>
+        </p:nvSpPr>
+        <p:spPr>
+          <a:xfrm>
+            <a:off x="5180182" y="983236"/>
+            <a:ext cx="2037351" cy="573368"/>
+          </a:xfrm>
+          <a:prstGeom prst="homePlate">
+            <a:avLst/>
+          </a:prstGeom>
+          <a:solidFill>
+            <a:srgbClr val="32B9CD"/>
+          </a:solidFill>
+          <a:ln>
+            <a:noFill/>
+          </a:ln>
+        </p:spPr>
+        <p:style>
+          <a:lnRef idx="2">
+            <a:schemeClr val="accent1">
+              <a:shade val="50000"/>
+            </a:schemeClr>
+          </a:lnRef>
+          <a:fillRef idx="1">
+            <a:schemeClr val="accent1"/>
+          </a:fillRef>
+          <a:effectRef idx="0">
+            <a:schemeClr val="accent1"/>
+          </a:effectRef>
+          <a:fontRef idx="minor">
+            <a:schemeClr val="lt1"/>
+          </a:fontRef>
+        </p:style>
+        <p:txBody>
+          <a:bodyPr rtlCol="0" anchor="ctr"/>
+          <a:lstStyle/>
+          <a:p>
+            <a:pPr algn="ctr"/>
+            <a:r>
+              <a:rPr lang="pt-BR" sz="1400" b="1" dirty="0"/>
+              <a:t>ONG</a:t>
+            </a:r>
+          </a:p>
+          <a:p>
+            <a:pPr algn="ctr"/>
+            <a:r>
+              <a:rPr lang="pt-BR" sz="1400" b="1" dirty="0"/>
+              <a:t>Precisa de doação</a:t>
+            </a:r>
+          </a:p>
+        </p:txBody>
+      </p:sp>
+      <p:sp>
+        <p:nvSpPr>
+          <p:cNvPr id="49" name="Seta: Pentágono 48">
+            <a:extLst>
+              <a:ext uri="{FF2B5EF4-FFF2-40B4-BE49-F238E27FC236}">
+                <a16:creationId xmlns:a16="http://schemas.microsoft.com/office/drawing/2014/main" id="{8EDA325D-DCA7-4133-96EA-C31FA7338D32}"/>
+              </a:ext>
+            </a:extLst>
+          </p:cNvPr>
+          <p:cNvSpPr/>
+          <p:nvPr/>
+        </p:nvSpPr>
+        <p:spPr>
+          <a:xfrm>
+            <a:off x="7305764" y="973689"/>
+            <a:ext cx="2037351" cy="573368"/>
+          </a:xfrm>
+          <a:prstGeom prst="homePlate">
+            <a:avLst/>
+          </a:prstGeom>
+          <a:solidFill>
+            <a:srgbClr val="32B9CD"/>
+          </a:solidFill>
+          <a:ln>
+            <a:noFill/>
+          </a:ln>
+        </p:spPr>
+        <p:style>
+          <a:lnRef idx="2">
+            <a:schemeClr val="accent1">
+              <a:shade val="50000"/>
+            </a:schemeClr>
+          </a:lnRef>
+          <a:fillRef idx="1">
+            <a:schemeClr val="accent1"/>
+          </a:fillRef>
+          <a:effectRef idx="0">
+            <a:schemeClr val="accent1"/>
+          </a:effectRef>
+          <a:fontRef idx="minor">
+            <a:schemeClr val="lt1"/>
+          </a:fontRef>
+        </p:style>
+        <p:txBody>
+          <a:bodyPr rtlCol="0" anchor="ctr"/>
+          <a:lstStyle/>
+          <a:p>
+            <a:pPr algn="ctr"/>
+            <a:r>
+              <a:rPr lang="pt-BR" sz="1400" b="1" dirty="0"/>
+              <a:t>Realiza doação segura</a:t>
+            </a:r>
+          </a:p>
+        </p:txBody>
+      </p:sp>
+      <p:sp>
+        <p:nvSpPr>
+          <p:cNvPr id="50" name="Seta: Pentágono 49">
+            <a:extLst>
+              <a:ext uri="{FF2B5EF4-FFF2-40B4-BE49-F238E27FC236}">
+                <a16:creationId xmlns:a16="http://schemas.microsoft.com/office/drawing/2014/main" id="{5EC95DA6-261C-490C-82F8-44E65FD49DAE}"/>
+              </a:ext>
+            </a:extLst>
+          </p:cNvPr>
+          <p:cNvSpPr/>
+          <p:nvPr/>
+        </p:nvSpPr>
+        <p:spPr>
+          <a:xfrm>
+            <a:off x="9431346" y="973689"/>
+            <a:ext cx="2037351" cy="573368"/>
+          </a:xfrm>
+          <a:prstGeom prst="homePlate">
+            <a:avLst/>
+          </a:prstGeom>
+          <a:solidFill>
+            <a:srgbClr val="32B9CD"/>
+          </a:solidFill>
+          <a:ln>
+            <a:noFill/>
+          </a:ln>
+        </p:spPr>
+        <p:style>
+          <a:lnRef idx="2">
+            <a:schemeClr val="accent1">
+              <a:shade val="50000"/>
+            </a:schemeClr>
+          </a:lnRef>
+          <a:fillRef idx="1">
+            <a:schemeClr val="accent1"/>
+          </a:fillRef>
+          <a:effectRef idx="0">
+            <a:schemeClr val="accent1"/>
+          </a:effectRef>
+          <a:fontRef idx="minor">
+            <a:schemeClr val="lt1"/>
+          </a:fontRef>
+        </p:style>
+        <p:txBody>
+          <a:bodyPr rtlCol="0" anchor="ctr"/>
+          <a:lstStyle/>
+          <a:p>
+            <a:pPr algn="ctr"/>
+            <a:r>
+              <a:rPr lang="pt-BR" sz="1400" b="1" dirty="0"/>
+              <a:t>Comprovar credibilidade da ONG</a:t>
+            </a:r>
+          </a:p>
+        </p:txBody>
+      </p:sp>
+      <p:pic>
+        <p:nvPicPr>
+          <p:cNvPr id="51" name="Gráfico 50" descr="Rosto neutro sem preenchimento ">
+            <a:extLst>
+              <a:ext uri="{FF2B5EF4-FFF2-40B4-BE49-F238E27FC236}">
+                <a16:creationId xmlns:a16="http://schemas.microsoft.com/office/drawing/2014/main" id="{2127BBAD-7756-4E1B-8A19-6E333BD977D8}"/>
+              </a:ext>
+            </a:extLst>
+          </p:cNvPr>
+          <p:cNvPicPr>
+            <a:picLocks noChangeAspect="1"/>
+          </p:cNvPicPr>
+          <p:nvPr/>
+        </p:nvPicPr>
+        <p:blipFill>
+          <a:blip r:embed="rId2">
+            <a:extLst>
+              <a:ext uri="{28A0092B-C50C-407E-A947-70E740481C1C}">
+                <a14:useLocalDpi xmlns:a14="http://schemas.microsoft.com/office/drawing/2010/main"/>
+              </a:ext>
+              <a:ext uri="{96DAC541-7B7A-43D3-8B79-37D633B846F1}">
+                <asvg:svgBlip xmlns:asvg="http://schemas.microsoft.com/office/drawing/2016/SVG/main" r:embed="rId3"/>
+              </a:ext>
+            </a:extLst>
+          </a:blip>
+          <a:stretch>
+            <a:fillRect/>
+          </a:stretch>
+        </p:blipFill>
+        <p:spPr>
+          <a:xfrm>
+            <a:off x="7627227" y="2944303"/>
+            <a:ext cx="914400" cy="914400"/>
+          </a:xfrm>
+          <a:prstGeom prst="rect">
+            <a:avLst/>
+          </a:prstGeom>
+        </p:spPr>
+      </p:pic>
+      <p:pic>
+        <p:nvPicPr>
+          <p:cNvPr id="52" name="Gráfico 51" descr="Rosto triste sem preenchimento ">
+            <a:extLst>
+              <a:ext uri="{FF2B5EF4-FFF2-40B4-BE49-F238E27FC236}">
+                <a16:creationId xmlns:a16="http://schemas.microsoft.com/office/drawing/2014/main" id="{26B4285F-B25E-4E4D-A786-129D4E9F2DCD}"/>
+              </a:ext>
+            </a:extLst>
+          </p:cNvPr>
+          <p:cNvPicPr>
+            <a:picLocks noChangeAspect="1"/>
+          </p:cNvPicPr>
+          <p:nvPr/>
+        </p:nvPicPr>
+        <p:blipFill>
+          <a:blip r:embed="rId4">
+            <a:extLst>
+              <a:ext uri="{28A0092B-C50C-407E-A947-70E740481C1C}">
+                <a14:useLocalDpi xmlns:a14="http://schemas.microsoft.com/office/drawing/2010/main"/>
+              </a:ext>
+              <a:ext uri="{96DAC541-7B7A-43D3-8B79-37D633B846F1}">
+                <asvg:svgBlip xmlns:asvg="http://schemas.microsoft.com/office/drawing/2016/SVG/main" r:embed="rId5"/>
+              </a:ext>
+            </a:extLst>
+          </a:blip>
+          <a:stretch>
+            <a:fillRect/>
+          </a:stretch>
+        </p:blipFill>
+        <p:spPr>
+          <a:xfrm>
+            <a:off x="9986277" y="2980014"/>
+            <a:ext cx="914400" cy="914400"/>
+          </a:xfrm>
+          <a:prstGeom prst="rect">
+            <a:avLst/>
+          </a:prstGeom>
+        </p:spPr>
+      </p:pic>
+      <p:sp>
+        <p:nvSpPr>
+          <p:cNvPr id="53" name="Retângulo 52">
+            <a:extLst>
+              <a:ext uri="{FF2B5EF4-FFF2-40B4-BE49-F238E27FC236}">
+                <a16:creationId xmlns:a16="http://schemas.microsoft.com/office/drawing/2014/main" id="{D7A13D1E-A5DD-4866-9187-AEF79DF0A7E2}"/>
+              </a:ext>
+            </a:extLst>
+          </p:cNvPr>
+          <p:cNvSpPr/>
+          <p:nvPr/>
+        </p:nvSpPr>
+        <p:spPr>
+          <a:xfrm>
+            <a:off x="5077324" y="1794445"/>
+            <a:ext cx="2037351" cy="646331"/>
+          </a:xfrm>
+          <a:prstGeom prst="rect">
+            <a:avLst/>
+          </a:prstGeom>
+        </p:spPr>
+        <p:txBody>
+          <a:bodyPr wrap="square">
+            <a:spAutoFit/>
+          </a:bodyPr>
+          <a:lstStyle/>
+          <a:p>
+            <a:pPr marL="342900" indent="-342900">
+              <a:buFont typeface="Arial" panose="020B0604020202020204" pitchFamily="34" charset="0"/>
+              <a:buChar char="•"/>
+            </a:pPr>
+            <a:r>
+              <a:rPr lang="pt-BR" dirty="0">
+                <a:latin typeface="Exo 2" panose="00000500000000000000" pitchFamily="50" charset="0"/>
+              </a:rPr>
+              <a:t>F</a:t>
+            </a:r>
+            <a:r>
+              <a:rPr lang="pt-BR" sz="1800" dirty="0">
+                <a:latin typeface="Exo 2" panose="00000500000000000000" pitchFamily="50" charset="0"/>
+              </a:rPr>
+              <a:t>azer o cadastro da sua ONG</a:t>
+            </a:r>
+          </a:p>
+        </p:txBody>
+      </p:sp>
+      <p:sp>
+        <p:nvSpPr>
+          <p:cNvPr id="54" name="Retângulo 53">
+            <a:extLst>
+              <a:ext uri="{FF2B5EF4-FFF2-40B4-BE49-F238E27FC236}">
+                <a16:creationId xmlns:a16="http://schemas.microsoft.com/office/drawing/2014/main" id="{39B19374-5D8A-4FAC-9951-BB083CB9913B}"/>
+              </a:ext>
+            </a:extLst>
+          </p:cNvPr>
+          <p:cNvSpPr/>
+          <p:nvPr/>
+        </p:nvSpPr>
+        <p:spPr>
+          <a:xfrm>
+            <a:off x="7128283" y="1769199"/>
+            <a:ext cx="2213224" cy="830997"/>
+          </a:xfrm>
+          <a:prstGeom prst="rect">
+            <a:avLst/>
+          </a:prstGeom>
+        </p:spPr>
+        <p:txBody>
+          <a:bodyPr wrap="square">
+            <a:spAutoFit/>
+          </a:bodyPr>
+          <a:lstStyle/>
+          <a:p>
+            <a:pPr marL="342900" indent="-342900">
+              <a:buFont typeface="Arial" panose="020B0604020202020204" pitchFamily="34" charset="0"/>
+              <a:buChar char="•"/>
+            </a:pPr>
+            <a:r>
+              <a:rPr lang="pt-BR" sz="1600" dirty="0">
+                <a:latin typeface="Exo 2" panose="00000500000000000000" pitchFamily="50" charset="0"/>
+              </a:rPr>
+              <a:t>Entrar em contato para conseguir se cadastrar</a:t>
+            </a:r>
+          </a:p>
+        </p:txBody>
+      </p:sp>
+      <p:sp>
+        <p:nvSpPr>
+          <p:cNvPr id="55" name="Retângulo 54">
+            <a:extLst>
+              <a:ext uri="{FF2B5EF4-FFF2-40B4-BE49-F238E27FC236}">
+                <a16:creationId xmlns:a16="http://schemas.microsoft.com/office/drawing/2014/main" id="{EBB57C47-DEC3-45F3-B1F0-086E64CB35E2}"/>
+              </a:ext>
+            </a:extLst>
+          </p:cNvPr>
+          <p:cNvSpPr/>
+          <p:nvPr/>
+        </p:nvSpPr>
+        <p:spPr>
+          <a:xfrm>
+            <a:off x="9244566" y="1744090"/>
+            <a:ext cx="2022724" cy="523220"/>
+          </a:xfrm>
+          <a:prstGeom prst="rect">
+            <a:avLst/>
+          </a:prstGeom>
+        </p:spPr>
+        <p:txBody>
+          <a:bodyPr wrap="square">
+            <a:spAutoFit/>
+          </a:bodyPr>
+          <a:lstStyle/>
+          <a:p>
+            <a:pPr marL="342900" indent="-342900">
+              <a:buFont typeface="Arial" panose="020B0604020202020204" pitchFamily="34" charset="0"/>
+              <a:buChar char="•"/>
+            </a:pPr>
+            <a:r>
+              <a:rPr lang="pt-BR" sz="1400" dirty="0">
+                <a:latin typeface="Exo 2" panose="00000500000000000000" pitchFamily="50" charset="0"/>
+              </a:rPr>
+              <a:t>Não ter seu cadastro aprovado</a:t>
+            </a:r>
+          </a:p>
+        </p:txBody>
+      </p:sp>
+      <p:pic>
+        <p:nvPicPr>
+          <p:cNvPr id="56" name="Gráfico 55" descr="Rosto sorridente sem preenchimento ">
+            <a:extLst>
+              <a:ext uri="{FF2B5EF4-FFF2-40B4-BE49-F238E27FC236}">
+                <a16:creationId xmlns:a16="http://schemas.microsoft.com/office/drawing/2014/main" id="{7A666621-80D0-4891-BC48-AD0E4E42F8E0}"/>
+              </a:ext>
+            </a:extLst>
+          </p:cNvPr>
+          <p:cNvPicPr>
+            <a:picLocks noChangeAspect="1"/>
+          </p:cNvPicPr>
+          <p:nvPr/>
+        </p:nvPicPr>
+        <p:blipFill>
+          <a:blip r:embed="rId6">
+            <a:extLst>
+              <a:ext uri="{28A0092B-C50C-407E-A947-70E740481C1C}">
+                <a14:useLocalDpi xmlns:a14="http://schemas.microsoft.com/office/drawing/2010/main"/>
+              </a:ext>
+              <a:ext uri="{96DAC541-7B7A-43D3-8B79-37D633B846F1}">
+                <asvg:svgBlip xmlns:asvg="http://schemas.microsoft.com/office/drawing/2016/SVG/main" r:embed="rId7"/>
+              </a:ext>
+            </a:extLst>
+          </a:blip>
+          <a:stretch>
+            <a:fillRect/>
+          </a:stretch>
+        </p:blipFill>
+        <p:spPr>
+          <a:xfrm>
+            <a:off x="3439063" y="2924981"/>
+            <a:ext cx="914400" cy="914400"/>
+          </a:xfrm>
+          <a:prstGeom prst="rect">
+            <a:avLst/>
+          </a:prstGeom>
+        </p:spPr>
+      </p:pic>
+      <p:pic>
+        <p:nvPicPr>
+          <p:cNvPr id="57" name="Gráfico 56" descr="Rosto sorridente sem preenchimento ">
+            <a:extLst>
+              <a:ext uri="{FF2B5EF4-FFF2-40B4-BE49-F238E27FC236}">
+                <a16:creationId xmlns:a16="http://schemas.microsoft.com/office/drawing/2014/main" id="{9D9727E8-DBCB-4236-AEDA-06CE90DF131D}"/>
+              </a:ext>
+            </a:extLst>
+          </p:cNvPr>
+          <p:cNvPicPr>
+            <a:picLocks noChangeAspect="1"/>
+          </p:cNvPicPr>
+          <p:nvPr/>
+        </p:nvPicPr>
+        <p:blipFill>
+          <a:blip r:embed="rId6">
+            <a:extLst>
+              <a:ext uri="{28A0092B-C50C-407E-A947-70E740481C1C}">
+                <a14:useLocalDpi xmlns:a14="http://schemas.microsoft.com/office/drawing/2010/main"/>
+              </a:ext>
+              <a:ext uri="{96DAC541-7B7A-43D3-8B79-37D633B846F1}">
+                <asvg:svgBlip xmlns:asvg="http://schemas.microsoft.com/office/drawing/2016/SVG/main" r:embed="rId7"/>
+              </a:ext>
+            </a:extLst>
+          </a:blip>
+          <a:stretch>
+            <a:fillRect/>
+          </a:stretch>
+        </p:blipFill>
+        <p:spPr>
+          <a:xfrm>
+            <a:off x="5492376" y="2924981"/>
+            <a:ext cx="914400" cy="914400"/>
+          </a:xfrm>
+          <a:prstGeom prst="rect">
+            <a:avLst/>
+          </a:prstGeom>
+        </p:spPr>
+      </p:pic>
+      <p:sp>
+        <p:nvSpPr>
+          <p:cNvPr id="58" name="Retângulo 57">
+            <a:extLst>
+              <a:ext uri="{FF2B5EF4-FFF2-40B4-BE49-F238E27FC236}">
+                <a16:creationId xmlns:a16="http://schemas.microsoft.com/office/drawing/2014/main" id="{8F00C3E8-0454-44A4-BA50-D35C01DF5B09}"/>
+              </a:ext>
+            </a:extLst>
+          </p:cNvPr>
+          <p:cNvSpPr/>
+          <p:nvPr/>
+        </p:nvSpPr>
+        <p:spPr>
+          <a:xfrm>
+            <a:off x="5180182" y="4273588"/>
+            <a:ext cx="2037351" cy="923330"/>
+          </a:xfrm>
+          <a:prstGeom prst="rect">
+            <a:avLst/>
+          </a:prstGeom>
+        </p:spPr>
+        <p:txBody>
+          <a:bodyPr wrap="square">
+            <a:spAutoFit/>
+          </a:bodyPr>
+          <a:lstStyle/>
+          <a:p>
+            <a:pPr marL="342900" indent="-342900">
+              <a:buFont typeface="Arial" panose="020B0604020202020204" pitchFamily="34" charset="0"/>
+              <a:buChar char="•"/>
+            </a:pPr>
+            <a:r>
+              <a:rPr lang="pt-BR" sz="1800" dirty="0">
+                <a:latin typeface="Exo 2" panose="00000500000000000000" pitchFamily="50" charset="0"/>
+              </a:rPr>
+              <a:t>Feliz em poder cadastrar sua ONG</a:t>
+            </a:r>
+          </a:p>
+        </p:txBody>
+      </p:sp>
+      <p:sp>
+        <p:nvSpPr>
+          <p:cNvPr id="59" name="Retângulo 58">
+            <a:extLst>
+              <a:ext uri="{FF2B5EF4-FFF2-40B4-BE49-F238E27FC236}">
+                <a16:creationId xmlns:a16="http://schemas.microsoft.com/office/drawing/2014/main" id="{532A7E00-C4E9-460C-B321-DCC569B5882A}"/>
+              </a:ext>
+            </a:extLst>
+          </p:cNvPr>
+          <p:cNvSpPr/>
+          <p:nvPr/>
+        </p:nvSpPr>
+        <p:spPr>
+          <a:xfrm>
+            <a:off x="7301759" y="4026470"/>
+            <a:ext cx="2037351" cy="1477328"/>
+          </a:xfrm>
+          <a:prstGeom prst="rect">
+            <a:avLst/>
+          </a:prstGeom>
+        </p:spPr>
+        <p:txBody>
+          <a:bodyPr wrap="square">
+            <a:spAutoFit/>
+          </a:bodyPr>
+          <a:lstStyle/>
+          <a:p>
+            <a:pPr marL="342900" indent="-342900">
+              <a:buFont typeface="Arial" panose="020B0604020202020204" pitchFamily="34" charset="0"/>
+              <a:buChar char="•"/>
+            </a:pPr>
+            <a:r>
+              <a:rPr lang="pt-BR" sz="1800" dirty="0">
+                <a:latin typeface="Exo 2" panose="00000500000000000000" pitchFamily="50" charset="0"/>
+              </a:rPr>
+              <a:t>O usuário fica desconfiado pois sua ONG tem que passar por aprovação</a:t>
+            </a:r>
+          </a:p>
+        </p:txBody>
+      </p:sp>
+      <p:sp>
+        <p:nvSpPr>
+          <p:cNvPr id="60" name="Retângulo 59">
+            <a:extLst>
+              <a:ext uri="{FF2B5EF4-FFF2-40B4-BE49-F238E27FC236}">
+                <a16:creationId xmlns:a16="http://schemas.microsoft.com/office/drawing/2014/main" id="{241B9C68-A1B4-4F98-BABF-50CCE251D775}"/>
+              </a:ext>
+            </a:extLst>
+          </p:cNvPr>
+          <p:cNvSpPr/>
+          <p:nvPr/>
+        </p:nvSpPr>
+        <p:spPr>
+          <a:xfrm>
+            <a:off x="9431345" y="4166677"/>
+            <a:ext cx="2037351" cy="1200329"/>
+          </a:xfrm>
+          <a:prstGeom prst="rect">
+            <a:avLst/>
+          </a:prstGeom>
+        </p:spPr>
+        <p:txBody>
+          <a:bodyPr wrap="square">
+            <a:spAutoFit/>
+          </a:bodyPr>
+          <a:lstStyle/>
+          <a:p>
+            <a:pPr marL="342900" indent="-342900">
+              <a:buFont typeface="Arial" panose="020B0604020202020204" pitchFamily="34" charset="0"/>
+              <a:buChar char="•"/>
+            </a:pPr>
+            <a:r>
+              <a:rPr lang="pt-BR" sz="1800" dirty="0">
+                <a:latin typeface="Exo 2" panose="00000500000000000000" pitchFamily="50" charset="0"/>
+              </a:rPr>
+              <a:t>ONG tem seu cadastro negado sem explicação</a:t>
+            </a:r>
+          </a:p>
+        </p:txBody>
+      </p:sp>
+      <p:sp>
+        <p:nvSpPr>
+          <p:cNvPr id="61" name="Retângulo 60">
+            <a:extLst>
+              <a:ext uri="{FF2B5EF4-FFF2-40B4-BE49-F238E27FC236}">
+                <a16:creationId xmlns:a16="http://schemas.microsoft.com/office/drawing/2014/main" id="{A56D14C9-993F-4016-AE5F-D3E5A8530D8D}"/>
+              </a:ext>
+            </a:extLst>
+          </p:cNvPr>
+          <p:cNvSpPr/>
+          <p:nvPr/>
+        </p:nvSpPr>
+        <p:spPr>
+          <a:xfrm>
+            <a:off x="5091951" y="5688449"/>
+            <a:ext cx="2115357" cy="1077218"/>
+          </a:xfrm>
+          <a:prstGeom prst="rect">
+            <a:avLst/>
+          </a:prstGeom>
+        </p:spPr>
+        <p:txBody>
+          <a:bodyPr wrap="square">
+            <a:spAutoFit/>
+          </a:bodyPr>
+          <a:lstStyle/>
+          <a:p>
+            <a:pPr marL="342900" indent="-342900">
+              <a:buFont typeface="Arial" panose="020B0604020202020204" pitchFamily="34" charset="0"/>
+              <a:buChar char="•"/>
+            </a:pPr>
+            <a:r>
+              <a:rPr lang="pt-BR" sz="1600" dirty="0">
+                <a:latin typeface="Exo 2" panose="00000500000000000000" pitchFamily="50" charset="0"/>
+              </a:rPr>
+              <a:t>ONG poderá se cadastrar no aplicativo de forma fácil e prática</a:t>
+            </a:r>
+          </a:p>
+        </p:txBody>
+      </p:sp>
+      <p:sp>
+        <p:nvSpPr>
+          <p:cNvPr id="62" name="Retângulo 61">
+            <a:extLst>
+              <a:ext uri="{FF2B5EF4-FFF2-40B4-BE49-F238E27FC236}">
+                <a16:creationId xmlns:a16="http://schemas.microsoft.com/office/drawing/2014/main" id="{02524AAB-47FE-4A1D-B979-9FDD84D9EE0B}"/>
+              </a:ext>
+            </a:extLst>
+          </p:cNvPr>
+          <p:cNvSpPr/>
+          <p:nvPr/>
+        </p:nvSpPr>
+        <p:spPr>
+          <a:xfrm>
+            <a:off x="7301759" y="5710083"/>
+            <a:ext cx="2037351" cy="1077218"/>
+          </a:xfrm>
+          <a:prstGeom prst="rect">
+            <a:avLst/>
+          </a:prstGeom>
+        </p:spPr>
+        <p:txBody>
+          <a:bodyPr wrap="square">
+            <a:spAutoFit/>
+          </a:bodyPr>
+          <a:lstStyle/>
+          <a:p>
+            <a:pPr marL="342900" indent="-342900">
+              <a:buFont typeface="Arial" panose="020B0604020202020204" pitchFamily="34" charset="0"/>
+              <a:buChar char="•"/>
+            </a:pPr>
+            <a:r>
+              <a:rPr lang="pt-BR" sz="1600" dirty="0">
+                <a:latin typeface="Exo 2" panose="00000500000000000000" pitchFamily="50" charset="0"/>
+              </a:rPr>
+              <a:t>Não precisará entrar em contato para realizar o cadastro. </a:t>
+            </a:r>
+          </a:p>
+        </p:txBody>
+      </p:sp>
+      <p:sp>
+        <p:nvSpPr>
+          <p:cNvPr id="63" name="Retângulo 62">
+            <a:extLst>
+              <a:ext uri="{FF2B5EF4-FFF2-40B4-BE49-F238E27FC236}">
+                <a16:creationId xmlns:a16="http://schemas.microsoft.com/office/drawing/2014/main" id="{BA214BDD-7682-4C94-8B9D-41DA43D2AF77}"/>
+              </a:ext>
+            </a:extLst>
+          </p:cNvPr>
+          <p:cNvSpPr/>
+          <p:nvPr/>
+        </p:nvSpPr>
+        <p:spPr>
+          <a:xfrm>
+            <a:off x="9433561" y="5669247"/>
+            <a:ext cx="2037351" cy="1077218"/>
+          </a:xfrm>
+          <a:prstGeom prst="rect">
+            <a:avLst/>
+          </a:prstGeom>
+        </p:spPr>
+        <p:txBody>
+          <a:bodyPr wrap="square">
+            <a:spAutoFit/>
+          </a:bodyPr>
+          <a:lstStyle/>
+          <a:p>
+            <a:pPr marL="342900" indent="-342900">
+              <a:buFont typeface="Arial" panose="020B0604020202020204" pitchFamily="34" charset="0"/>
+              <a:buChar char="•"/>
+            </a:pPr>
+            <a:r>
+              <a:rPr lang="pt-BR" sz="1600" dirty="0">
+                <a:latin typeface="Exo 2" panose="00000500000000000000" pitchFamily="50" charset="0"/>
+              </a:rPr>
+              <a:t>Após o cadastro a ONG já estará liberada pra usar o site</a:t>
+            </a:r>
+          </a:p>
+        </p:txBody>
+      </p:sp>
+    </p:spTree>
+    <p:extLst>
+      <p:ext uri="{BB962C8B-B14F-4D97-AF65-F5344CB8AC3E}">
+        <p14:creationId xmlns:p14="http://schemas.microsoft.com/office/powerpoint/2010/main" val="1970977602"/>
+      </p:ext>
+    </p:extLst>
+  </p:cSld>
+  <p:clrMapOvr>
+    <a:masterClrMapping/>
+  </p:clrMapOvr>
+</p:sld>
+</file>
+
+<file path=ppt/slides/slide13.xml><?xml version="1.0" encoding="utf-8"?>
+<p:sld xmlns:a="http://schemas.openxmlformats.org/drawingml/2006/main" xmlns:r="http://schemas.openxmlformats.org/officeDocument/2006/relationships" xmlns:p="http://schemas.openxmlformats.org/presentationml/2006/main">
+  <p:cSld>
+    <p:spTree>
+      <p:nvGrpSpPr>
+        <p:cNvPr id="1" name=""/>
+        <p:cNvGrpSpPr/>
+        <p:nvPr/>
+      </p:nvGrpSpPr>
+      <p:grpSpPr>
+        <a:xfrm>
+          <a:off x="0" y="0"/>
+          <a:ext cx="0" cy="0"/>
+          <a:chOff x="0" y="0"/>
+          <a:chExt cx="0" cy="0"/>
+        </a:xfrm>
+      </p:grpSpPr>
     </p:spTree>
     <p:extLst>
       <p:ext uri="{BB962C8B-B14F-4D97-AF65-F5344CB8AC3E}">
@@ -18988,13 +20341,13 @@
 
 <file path=customXml/item1.xml><?xml version="1.0" encoding="utf-8"?>
 <Control xmlns="http://schemas.microsoft.com/VisualStudio/2011/storyboarding/control">
-  <Id Name="System.Storyboarding.Common.Button" Revision="1" Stencil="System.Storyboarding.Common" StencilVersion="0.1"/>
+  <Id Name="System.Storyboarding.Common.MousePointer" Revision="1" Stencil="System.Storyboarding.Common" StencilVersion="0.1"/>
 </Control>
 </file>
 
 <file path=customXml/item2.xml><?xml version="1.0" encoding="utf-8"?>
 <Control xmlns="http://schemas.microsoft.com/VisualStudio/2011/storyboarding/control">
-  <Id Name="System.Storyboarding.Common.MousePointer" Revision="1" Stencil="System.Storyboarding.Common" StencilVersion="0.1"/>
+  <Id Name="System.Storyboarding.Common.Button" Revision="1" Stencil="System.Storyboarding.Common" StencilVersion="0.1"/>
 </Control>
 </file>
 
@@ -19005,7 +20358,7 @@
 </file>
 
 <file path=customXml/itemProps1.xml><?xml version="1.0" encoding="utf-8"?>
-<ds:datastoreItem xmlns:ds="http://schemas.openxmlformats.org/officeDocument/2006/customXml" ds:itemID="{89972C15-A741-472E-B305-DD97487358F0}">
+<ds:datastoreItem xmlns:ds="http://schemas.openxmlformats.org/officeDocument/2006/customXml" ds:itemID="{817C9E37-650B-4CCF-B951-DE51C8217DA2}">
   <ds:schemaRefs>
     <ds:schemaRef ds:uri="http://schemas.microsoft.com/VisualStudio/2011/storyboarding/control"/>
   </ds:schemaRefs>
@@ -19013,7 +20366,7 @@
 </file>
 
 <file path=customXml/itemProps2.xml><?xml version="1.0" encoding="utf-8"?>
-<ds:datastoreItem xmlns:ds="http://schemas.openxmlformats.org/officeDocument/2006/customXml" ds:itemID="{817C9E37-650B-4CCF-B951-DE51C8217DA2}">
+<ds:datastoreItem xmlns:ds="http://schemas.openxmlformats.org/officeDocument/2006/customXml" ds:itemID="{89972C15-A741-472E-B305-DD97487358F0}">
   <ds:schemaRefs>
     <ds:schemaRef ds:uri="http://schemas.microsoft.com/VisualStudio/2011/storyboarding/control"/>
   </ds:schemaRefs>

</xml_diff>